<commit_message>
Add pictures of visualvm
</commit_message>
<xml_diff>
--- a/swar_learn_duel.pptx
+++ b/swar_learn_duel.pptx
@@ -118,11 +118,12 @@
       </a:defRPr>
     </a:lvl9pPr>
   </p:defaultTextStyle>
+  <p:extLst>
+    <p:ext uri="{EFAFB233-063F-42B5-8137-9DF3F51BA10A}">
+      <p15:sldGuideLst xmlns:p15="http://schemas.microsoft.com/office/powerpoint/2012/main"/>
+    </p:ext>
+  </p:extLst>
 </p:presentation>
-</file>
-
-<file path=ppt/revisionInfo.xml><?xml version="1.0" encoding="utf-8"?>
-<p1510:revInfo xmlns:a="http://schemas.openxmlformats.org/drawingml/2006/main" xmlns:r="http://schemas.openxmlformats.org/officeDocument/2006/relationships" xmlns:p1510="http://schemas.microsoft.com/office/powerpoint/2015/10/main"/>
 </file>
 
 <file path=ppt/notesMasters/notesMaster1.xml><?xml version="1.0" encoding="utf-8"?>
@@ -207,7 +208,7 @@
           <a:p>
             <a:fld id="{00415DF2-79BD-4C64-A5B8-D9BBB90DCD43}" type="datetimeFigureOut">
               <a:rPr lang="de-DE" smtClean="0"/>
-              <a:t>13.06.2018</a:t>
+              <a:t>19.06.18</a:t>
             </a:fld>
             <a:endParaRPr lang="de-DE"/>
           </a:p>
@@ -624,7 +625,7 @@
           <a:p>
             <a:fld id="{78ED61D8-61CA-4D1F-9555-82B6FF3A8AB5}" type="datetimeFigureOut">
               <a:rPr lang="de-DE" smtClean="0"/>
-              <a:t>13.06.2018</a:t>
+              <a:t>19.06.18</a:t>
             </a:fld>
             <a:endParaRPr lang="de-DE"/>
           </a:p>
@@ -848,7 +849,7 @@
           <a:p>
             <a:fld id="{78ED61D8-61CA-4D1F-9555-82B6FF3A8AB5}" type="datetimeFigureOut">
               <a:rPr lang="de-DE" smtClean="0"/>
-              <a:t>13.06.2018</a:t>
+              <a:t>19.06.18</a:t>
             </a:fld>
             <a:endParaRPr lang="de-DE"/>
           </a:p>
@@ -1058,7 +1059,7 @@
           <a:p>
             <a:fld id="{78ED61D8-61CA-4D1F-9555-82B6FF3A8AB5}" type="datetimeFigureOut">
               <a:rPr lang="de-DE" smtClean="0"/>
-              <a:t>13.06.2018</a:t>
+              <a:t>19.06.18</a:t>
             </a:fld>
             <a:endParaRPr lang="de-DE"/>
           </a:p>
@@ -1258,7 +1259,7 @@
           <a:p>
             <a:fld id="{78ED61D8-61CA-4D1F-9555-82B6FF3A8AB5}" type="datetimeFigureOut">
               <a:rPr lang="de-DE" smtClean="0"/>
-              <a:t>13.06.2018</a:t>
+              <a:t>19.06.18</a:t>
             </a:fld>
             <a:endParaRPr lang="de-DE"/>
           </a:p>
@@ -1534,7 +1535,7 @@
           <a:p>
             <a:fld id="{78ED61D8-61CA-4D1F-9555-82B6FF3A8AB5}" type="datetimeFigureOut">
               <a:rPr lang="de-DE" smtClean="0"/>
-              <a:t>13.06.2018</a:t>
+              <a:t>19.06.18</a:t>
             </a:fld>
             <a:endParaRPr lang="de-DE"/>
           </a:p>
@@ -1802,7 +1803,7 @@
           <a:p>
             <a:fld id="{78ED61D8-61CA-4D1F-9555-82B6FF3A8AB5}" type="datetimeFigureOut">
               <a:rPr lang="de-DE" smtClean="0"/>
-              <a:t>13.06.2018</a:t>
+              <a:t>19.06.18</a:t>
             </a:fld>
             <a:endParaRPr lang="de-DE"/>
           </a:p>
@@ -2217,7 +2218,7 @@
           <a:p>
             <a:fld id="{78ED61D8-61CA-4D1F-9555-82B6FF3A8AB5}" type="datetimeFigureOut">
               <a:rPr lang="de-DE" smtClean="0"/>
-              <a:t>13.06.2018</a:t>
+              <a:t>19.06.18</a:t>
             </a:fld>
             <a:endParaRPr lang="de-DE"/>
           </a:p>
@@ -2359,7 +2360,7 @@
           <a:p>
             <a:fld id="{78ED61D8-61CA-4D1F-9555-82B6FF3A8AB5}" type="datetimeFigureOut">
               <a:rPr lang="de-DE" smtClean="0"/>
-              <a:t>13.06.2018</a:t>
+              <a:t>19.06.18</a:t>
             </a:fld>
             <a:endParaRPr lang="de-DE"/>
           </a:p>
@@ -2472,7 +2473,7 @@
           <a:p>
             <a:fld id="{78ED61D8-61CA-4D1F-9555-82B6FF3A8AB5}" type="datetimeFigureOut">
               <a:rPr lang="de-DE" smtClean="0"/>
-              <a:t>13.06.2018</a:t>
+              <a:t>19.06.18</a:t>
             </a:fld>
             <a:endParaRPr lang="de-DE"/>
           </a:p>
@@ -2785,7 +2786,7 @@
           <a:p>
             <a:fld id="{78ED61D8-61CA-4D1F-9555-82B6FF3A8AB5}" type="datetimeFigureOut">
               <a:rPr lang="de-DE" smtClean="0"/>
-              <a:t>13.06.2018</a:t>
+              <a:t>19.06.18</a:t>
             </a:fld>
             <a:endParaRPr lang="de-DE"/>
           </a:p>
@@ -3074,7 +3075,7 @@
           <a:p>
             <a:fld id="{78ED61D8-61CA-4D1F-9555-82B6FF3A8AB5}" type="datetimeFigureOut">
               <a:rPr lang="de-DE" smtClean="0"/>
-              <a:t>13.06.2018</a:t>
+              <a:t>19.06.18</a:t>
             </a:fld>
             <a:endParaRPr lang="de-DE"/>
           </a:p>
@@ -3317,7 +3318,7 @@
           <a:p>
             <a:fld id="{78ED61D8-61CA-4D1F-9555-82B6FF3A8AB5}" type="datetimeFigureOut">
               <a:rPr lang="de-DE" smtClean="0"/>
-              <a:t>13.06.2018</a:t>
+              <a:t>19.06.18</a:t>
             </a:fld>
             <a:endParaRPr lang="de-DE"/>
           </a:p>
@@ -3790,7 +3791,7 @@
                 <a16:creationId xmlns:a16="http://schemas.microsoft.com/office/drawing/2014/main" id="{793EF0C2-EE57-40DD-B754-BF1477FABABB}"/>
               </a:ext>
               <a:ext uri="{C183D7F6-B498-43B3-948B-1728B52AA6E4}">
-                <adec:decorative xmlns="" xmlns:adec="http://schemas.microsoft.com/office/drawing/2017/decorative" val="1"/>
+                <adec:decorative xmlns:adec="http://schemas.microsoft.com/office/drawing/2017/decorative" val="1"/>
               </a:ext>
             </a:extLst>
           </p:cNvPr>
@@ -3979,7 +3980,7 @@
                 <a16:creationId xmlns:a16="http://schemas.microsoft.com/office/drawing/2014/main" id="{EA67B5B4-3A24-436E-B663-1B2EBFF8A0CD}"/>
               </a:ext>
               <a:ext uri="{C183D7F6-B498-43B3-948B-1728B52AA6E4}">
-                <adec:decorative xmlns="" xmlns:adec="http://schemas.microsoft.com/office/drawing/2017/decorative" val="1"/>
+                <adec:decorative xmlns:adec="http://schemas.microsoft.com/office/drawing/2017/decorative" val="1"/>
               </a:ext>
             </a:extLst>
           </p:cNvPr>
@@ -4042,7 +4043,7 @@
                 <a16:creationId xmlns:a16="http://schemas.microsoft.com/office/drawing/2014/main" id="{987FDF89-C993-41F4-A1B8-DBAFF16008A9}"/>
               </a:ext>
               <a:ext uri="{C183D7F6-B498-43B3-948B-1728B52AA6E4}">
-                <adec:decorative xmlns="" xmlns:adec="http://schemas.microsoft.com/office/drawing/2017/decorative" val="1"/>
+                <adec:decorative xmlns:adec="http://schemas.microsoft.com/office/drawing/2017/decorative" val="1"/>
               </a:ext>
             </a:extLst>
           </p:cNvPr>
@@ -4150,7 +4151,7 @@
                 <a16:creationId xmlns:a16="http://schemas.microsoft.com/office/drawing/2014/main" id="{64E585EA-75FD-4025-8270-F66A58A15CDA}"/>
               </a:ext>
               <a:ext uri="{C183D7F6-B498-43B3-948B-1728B52AA6E4}">
-                <adec:decorative xmlns="" xmlns:adec="http://schemas.microsoft.com/office/drawing/2017/decorative" val="1"/>
+                <adec:decorative xmlns:adec="http://schemas.microsoft.com/office/drawing/2017/decorative" val="1"/>
               </a:ext>
             </a:extLst>
           </p:cNvPr>
@@ -4330,16 +4331,67 @@
                   <a:srgbClr val="FFFFFF"/>
                 </a:solidFill>
               </a:rPr>
-              <a:t>MongoDB</a:t>
-            </a:r>
-            <a:endParaRPr lang="de-DE" sz="2000" dirty="0">
-              <a:solidFill>
-                <a:srgbClr val="FFFFFF"/>
-              </a:solidFill>
-            </a:endParaRPr>
-          </a:p>
-        </p:txBody>
-      </p:sp>
+              <a:t>Database: MongoDB</a:t>
+            </a:r>
+          </a:p>
+          <a:p>
+            <a:r>
+              <a:rPr lang="en-GB" sz="2000" dirty="0">
+                <a:solidFill>
+                  <a:srgbClr val="FFFFFF"/>
+                </a:solidFill>
+              </a:rPr>
+              <a:t>Test: write to the database 1000 times (game results) </a:t>
+            </a:r>
+          </a:p>
+          <a:p>
+            <a:r>
+              <a:rPr lang="en-GB" sz="2000" dirty="0">
+                <a:solidFill>
+                  <a:srgbClr val="FFFFFF"/>
+                </a:solidFill>
+              </a:rPr>
+              <a:t>Timing</a:t>
+            </a:r>
+          </a:p>
+        </p:txBody>
+      </p:sp>
+      <p:pic>
+        <p:nvPicPr>
+          <p:cNvPr id="12" name="Picture 11">
+            <a:extLst>
+              <a:ext uri="{FF2B5EF4-FFF2-40B4-BE49-F238E27FC236}">
+                <a16:creationId xmlns:a16="http://schemas.microsoft.com/office/drawing/2014/main" id="{0B8EE2E1-DF00-6946-ABF4-EE27CA61E7C2}"/>
+              </a:ext>
+            </a:extLst>
+          </p:cNvPr>
+          <p:cNvPicPr>
+            <a:picLocks noChangeAspect="1"/>
+          </p:cNvPicPr>
+          <p:nvPr/>
+        </p:nvPicPr>
+        <p:blipFill>
+          <a:blip r:embed="rId2">
+            <a:extLst>
+              <a:ext uri="{28A0092B-C50C-407E-A947-70E740481C1C}">
+                <a14:useLocalDpi xmlns:a14="http://schemas.microsoft.com/office/drawing/2010/main" val="0"/>
+              </a:ext>
+            </a:extLst>
+          </a:blip>
+          <a:stretch>
+            <a:fillRect/>
+          </a:stretch>
+        </p:blipFill>
+        <p:spPr>
+          <a:xfrm>
+            <a:off x="827808" y="3227408"/>
+            <a:ext cx="10515593" cy="2084589"/>
+          </a:xfrm>
+          <a:prstGeom prst="rect">
+            <a:avLst/>
+          </a:prstGeom>
+        </p:spPr>
+      </p:pic>
     </p:spTree>
     <p:extLst>
       <p:ext uri="{BB962C8B-B14F-4D97-AF65-F5344CB8AC3E}">
@@ -4386,7 +4438,7 @@
                 <a16:creationId xmlns:a16="http://schemas.microsoft.com/office/drawing/2014/main" id="{EA67B5B4-3A24-436E-B663-1B2EBFF8A0CD}"/>
               </a:ext>
               <a:ext uri="{C183D7F6-B498-43B3-948B-1728B52AA6E4}">
-                <adec:decorative xmlns="" xmlns:adec="http://schemas.microsoft.com/office/drawing/2017/decorative" val="1"/>
+                <adec:decorative xmlns:adec="http://schemas.microsoft.com/office/drawing/2017/decorative" val="1"/>
               </a:ext>
             </a:extLst>
           </p:cNvPr>
@@ -4449,7 +4501,7 @@
                 <a16:creationId xmlns:a16="http://schemas.microsoft.com/office/drawing/2014/main" id="{987FDF89-C993-41F4-A1B8-DBAFF16008A9}"/>
               </a:ext>
               <a:ext uri="{C183D7F6-B498-43B3-948B-1728B52AA6E4}">
-                <adec:decorative xmlns="" xmlns:adec="http://schemas.microsoft.com/office/drawing/2017/decorative" val="1"/>
+                <adec:decorative xmlns:adec="http://schemas.microsoft.com/office/drawing/2017/decorative" val="1"/>
               </a:ext>
             </a:extLst>
           </p:cNvPr>
@@ -4557,7 +4609,7 @@
                 <a16:creationId xmlns:a16="http://schemas.microsoft.com/office/drawing/2014/main" id="{64E585EA-75FD-4025-8270-F66A58A15CDA}"/>
               </a:ext>
               <a:ext uri="{C183D7F6-B498-43B3-948B-1728B52AA6E4}">
-                <adec:decorative xmlns="" xmlns:adec="http://schemas.microsoft.com/office/drawing/2017/decorative" val="1"/>
+                <adec:decorative xmlns:adec="http://schemas.microsoft.com/office/drawing/2017/decorative" val="1"/>
               </a:ext>
             </a:extLst>
           </p:cNvPr>
@@ -4688,14 +4740,14 @@
           <a:lstStyle/>
           <a:p>
             <a:r>
-              <a:rPr lang="en-GB">
+              <a:rPr lang="en-GB" dirty="0">
                 <a:solidFill>
                   <a:srgbClr val="FFFFFF"/>
                 </a:solidFill>
               </a:rPr>
               <a:t>Performance Testing</a:t>
             </a:r>
-            <a:endParaRPr lang="de-DE">
+            <a:endParaRPr lang="de-DE" dirty="0">
               <a:solidFill>
                 <a:srgbClr val="FFFFFF"/>
               </a:solidFill>
@@ -4705,10 +4757,10 @@
       </p:sp>
       <p:sp>
         <p:nvSpPr>
-          <p:cNvPr id="3" name="Content Placeholder 2">
-            <a:extLst>
-              <a:ext uri="{FF2B5EF4-FFF2-40B4-BE49-F238E27FC236}">
-                <a16:creationId xmlns:a16="http://schemas.microsoft.com/office/drawing/2014/main" id="{28C27B4B-ACD4-45BA-A576-ADEB5F08A5FC}"/>
+          <p:cNvPr id="14" name="Content Placeholder 2">
+            <a:extLst>
+              <a:ext uri="{FF2B5EF4-FFF2-40B4-BE49-F238E27FC236}">
+                <a16:creationId xmlns:a16="http://schemas.microsoft.com/office/drawing/2014/main" id="{A1BE1607-0F4C-8548-BAF3-104FB2EA63AB}"/>
               </a:ext>
             </a:extLst>
           </p:cNvPr>
@@ -4731,7 +4783,7 @@
           </a:bodyPr>
           <a:lstStyle/>
           <a:p>
-            <a:endParaRPr lang="de-DE" sz="2000">
+            <a:endParaRPr lang="de-DE" sz="2000" dirty="0">
               <a:solidFill>
                 <a:srgbClr val="FFFFFF"/>
               </a:solidFill>
@@ -4785,7 +4837,7 @@
                 <a16:creationId xmlns:a16="http://schemas.microsoft.com/office/drawing/2014/main" id="{EA67B5B4-3A24-436E-B663-1B2EBFF8A0CD}"/>
               </a:ext>
               <a:ext uri="{C183D7F6-B498-43B3-948B-1728B52AA6E4}">
-                <adec:decorative xmlns="" xmlns:adec="http://schemas.microsoft.com/office/drawing/2017/decorative" val="1"/>
+                <adec:decorative xmlns:adec="http://schemas.microsoft.com/office/drawing/2017/decorative" val="1"/>
               </a:ext>
             </a:extLst>
           </p:cNvPr>
@@ -4848,7 +4900,7 @@
                 <a16:creationId xmlns:a16="http://schemas.microsoft.com/office/drawing/2014/main" id="{987FDF89-C993-41F4-A1B8-DBAFF16008A9}"/>
               </a:ext>
               <a:ext uri="{C183D7F6-B498-43B3-948B-1728B52AA6E4}">
-                <adec:decorative xmlns="" xmlns:adec="http://schemas.microsoft.com/office/drawing/2017/decorative" val="1"/>
+                <adec:decorative xmlns:adec="http://schemas.microsoft.com/office/drawing/2017/decorative" val="1"/>
               </a:ext>
             </a:extLst>
           </p:cNvPr>
@@ -4956,7 +5008,7 @@
                 <a16:creationId xmlns:a16="http://schemas.microsoft.com/office/drawing/2014/main" id="{64E585EA-75FD-4025-8270-F66A58A15CDA}"/>
               </a:ext>
               <a:ext uri="{C183D7F6-B498-43B3-948B-1728B52AA6E4}">
-                <adec:decorative xmlns="" xmlns:adec="http://schemas.microsoft.com/office/drawing/2017/decorative" val="1"/>
+                <adec:decorative xmlns:adec="http://schemas.microsoft.com/office/drawing/2017/decorative" val="1"/>
               </a:ext>
             </a:extLst>
           </p:cNvPr>
@@ -5130,7 +5182,7 @@
           </a:bodyPr>
           <a:lstStyle/>
           <a:p>
-            <a:endParaRPr lang="de-DE" sz="2000">
+            <a:endParaRPr lang="de-DE" sz="2000" dirty="0">
               <a:solidFill>
                 <a:srgbClr val="FFFFFF"/>
               </a:solidFill>
@@ -5184,7 +5236,7 @@
                 <a16:creationId xmlns:a16="http://schemas.microsoft.com/office/drawing/2014/main" id="{EA67B5B4-3A24-436E-B663-1B2EBFF8A0CD}"/>
               </a:ext>
               <a:ext uri="{C183D7F6-B498-43B3-948B-1728B52AA6E4}">
-                <adec:decorative xmlns="" xmlns:adec="http://schemas.microsoft.com/office/drawing/2017/decorative" val="1"/>
+                <adec:decorative xmlns:adec="http://schemas.microsoft.com/office/drawing/2017/decorative" val="1"/>
               </a:ext>
             </a:extLst>
           </p:cNvPr>
@@ -5247,7 +5299,7 @@
                 <a16:creationId xmlns:a16="http://schemas.microsoft.com/office/drawing/2014/main" id="{987FDF89-C993-41F4-A1B8-DBAFF16008A9}"/>
               </a:ext>
               <a:ext uri="{C183D7F6-B498-43B3-948B-1728B52AA6E4}">
-                <adec:decorative xmlns="" xmlns:adec="http://schemas.microsoft.com/office/drawing/2017/decorative" val="1"/>
+                <adec:decorative xmlns:adec="http://schemas.microsoft.com/office/drawing/2017/decorative" val="1"/>
               </a:ext>
             </a:extLst>
           </p:cNvPr>
@@ -5355,7 +5407,7 @@
                 <a16:creationId xmlns:a16="http://schemas.microsoft.com/office/drawing/2014/main" id="{64E585EA-75FD-4025-8270-F66A58A15CDA}"/>
               </a:ext>
               <a:ext uri="{C183D7F6-B498-43B3-948B-1728B52AA6E4}">
-                <adec:decorative xmlns="" xmlns:adec="http://schemas.microsoft.com/office/drawing/2017/decorative" val="1"/>
+                <adec:decorative xmlns:adec="http://schemas.microsoft.com/office/drawing/2017/decorative" val="1"/>
               </a:ext>
             </a:extLst>
           </p:cNvPr>
@@ -5583,7 +5635,7 @@
                 <a16:creationId xmlns:a16="http://schemas.microsoft.com/office/drawing/2014/main" id="{EA67B5B4-3A24-436E-B663-1B2EBFF8A0CD}"/>
               </a:ext>
               <a:ext uri="{C183D7F6-B498-43B3-948B-1728B52AA6E4}">
-                <adec:decorative xmlns="" xmlns:adec="http://schemas.microsoft.com/office/drawing/2017/decorative" val="1"/>
+                <adec:decorative xmlns:adec="http://schemas.microsoft.com/office/drawing/2017/decorative" val="1"/>
               </a:ext>
             </a:extLst>
           </p:cNvPr>
@@ -5646,7 +5698,7 @@
                 <a16:creationId xmlns:a16="http://schemas.microsoft.com/office/drawing/2014/main" id="{987FDF89-C993-41F4-A1B8-DBAFF16008A9}"/>
               </a:ext>
               <a:ext uri="{C183D7F6-B498-43B3-948B-1728B52AA6E4}">
-                <adec:decorative xmlns="" xmlns:adec="http://schemas.microsoft.com/office/drawing/2017/decorative" val="1"/>
+                <adec:decorative xmlns:adec="http://schemas.microsoft.com/office/drawing/2017/decorative" val="1"/>
               </a:ext>
             </a:extLst>
           </p:cNvPr>
@@ -5754,7 +5806,7 @@
                 <a16:creationId xmlns:a16="http://schemas.microsoft.com/office/drawing/2014/main" id="{64E585EA-75FD-4025-8270-F66A58A15CDA}"/>
               </a:ext>
               <a:ext uri="{C183D7F6-B498-43B3-948B-1728B52AA6E4}">
-                <adec:decorative xmlns="" xmlns:adec="http://schemas.microsoft.com/office/drawing/2017/decorative" val="1"/>
+                <adec:decorative xmlns:adec="http://schemas.microsoft.com/office/drawing/2017/decorative" val="1"/>
               </a:ext>
             </a:extLst>
           </p:cNvPr>
@@ -5982,7 +6034,7 @@
                 <a16:creationId xmlns:a16="http://schemas.microsoft.com/office/drawing/2014/main" id="{EA67B5B4-3A24-436E-B663-1B2EBFF8A0CD}"/>
               </a:ext>
               <a:ext uri="{C183D7F6-B498-43B3-948B-1728B52AA6E4}">
-                <adec:decorative xmlns="" xmlns:adec="http://schemas.microsoft.com/office/drawing/2017/decorative" val="1"/>
+                <adec:decorative xmlns:adec="http://schemas.microsoft.com/office/drawing/2017/decorative" val="1"/>
               </a:ext>
             </a:extLst>
           </p:cNvPr>
@@ -6045,7 +6097,7 @@
                 <a16:creationId xmlns:a16="http://schemas.microsoft.com/office/drawing/2014/main" id="{987FDF89-C993-41F4-A1B8-DBAFF16008A9}"/>
               </a:ext>
               <a:ext uri="{C183D7F6-B498-43B3-948B-1728B52AA6E4}">
-                <adec:decorative xmlns="" xmlns:adec="http://schemas.microsoft.com/office/drawing/2017/decorative" val="1"/>
+                <adec:decorative xmlns:adec="http://schemas.microsoft.com/office/drawing/2017/decorative" val="1"/>
               </a:ext>
             </a:extLst>
           </p:cNvPr>
@@ -6153,7 +6205,7 @@
                 <a16:creationId xmlns:a16="http://schemas.microsoft.com/office/drawing/2014/main" id="{64E585EA-75FD-4025-8270-F66A58A15CDA}"/>
               </a:ext>
               <a:ext uri="{C183D7F6-B498-43B3-948B-1728B52AA6E4}">
-                <adec:decorative xmlns="" xmlns:adec="http://schemas.microsoft.com/office/drawing/2017/decorative" val="1"/>
+                <adec:decorative xmlns:adec="http://schemas.microsoft.com/office/drawing/2017/decorative" val="1"/>
               </a:ext>
             </a:extLst>
           </p:cNvPr>
@@ -6381,7 +6433,7 @@
                 <a16:creationId xmlns:a16="http://schemas.microsoft.com/office/drawing/2014/main" id="{EA67B5B4-3A24-436E-B663-1B2EBFF8A0CD}"/>
               </a:ext>
               <a:ext uri="{C183D7F6-B498-43B3-948B-1728B52AA6E4}">
-                <adec:decorative xmlns="" xmlns:adec="http://schemas.microsoft.com/office/drawing/2017/decorative" val="1"/>
+                <adec:decorative xmlns:adec="http://schemas.microsoft.com/office/drawing/2017/decorative" val="1"/>
               </a:ext>
             </a:extLst>
           </p:cNvPr>
@@ -6444,7 +6496,7 @@
                 <a16:creationId xmlns:a16="http://schemas.microsoft.com/office/drawing/2014/main" id="{987FDF89-C993-41F4-A1B8-DBAFF16008A9}"/>
               </a:ext>
               <a:ext uri="{C183D7F6-B498-43B3-948B-1728B52AA6E4}">
-                <adec:decorative xmlns="" xmlns:adec="http://schemas.microsoft.com/office/drawing/2017/decorative" val="1"/>
+                <adec:decorative xmlns:adec="http://schemas.microsoft.com/office/drawing/2017/decorative" val="1"/>
               </a:ext>
             </a:extLst>
           </p:cNvPr>
@@ -6552,7 +6604,7 @@
                 <a16:creationId xmlns:a16="http://schemas.microsoft.com/office/drawing/2014/main" id="{64E585EA-75FD-4025-8270-F66A58A15CDA}"/>
               </a:ext>
               <a:ext uri="{C183D7F6-B498-43B3-948B-1728B52AA6E4}">
-                <adec:decorative xmlns="" xmlns:adec="http://schemas.microsoft.com/office/drawing/2017/decorative" val="1"/>
+                <adec:decorative xmlns:adec="http://schemas.microsoft.com/office/drawing/2017/decorative" val="1"/>
               </a:ext>
             </a:extLst>
           </p:cNvPr>
@@ -6780,7 +6832,7 @@
                 <a16:creationId xmlns:a16="http://schemas.microsoft.com/office/drawing/2014/main" id="{EA67B5B4-3A24-436E-B663-1B2EBFF8A0CD}"/>
               </a:ext>
               <a:ext uri="{C183D7F6-B498-43B3-948B-1728B52AA6E4}">
-                <adec:decorative xmlns="" xmlns:adec="http://schemas.microsoft.com/office/drawing/2017/decorative" val="1"/>
+                <adec:decorative xmlns:adec="http://schemas.microsoft.com/office/drawing/2017/decorative" val="1"/>
               </a:ext>
             </a:extLst>
           </p:cNvPr>
@@ -6843,7 +6895,7 @@
                 <a16:creationId xmlns:a16="http://schemas.microsoft.com/office/drawing/2014/main" id="{987FDF89-C993-41F4-A1B8-DBAFF16008A9}"/>
               </a:ext>
               <a:ext uri="{C183D7F6-B498-43B3-948B-1728B52AA6E4}">
-                <adec:decorative xmlns="" xmlns:adec="http://schemas.microsoft.com/office/drawing/2017/decorative" val="1"/>
+                <adec:decorative xmlns:adec="http://schemas.microsoft.com/office/drawing/2017/decorative" val="1"/>
               </a:ext>
             </a:extLst>
           </p:cNvPr>
@@ -6951,7 +7003,7 @@
                 <a16:creationId xmlns:a16="http://schemas.microsoft.com/office/drawing/2014/main" id="{64E585EA-75FD-4025-8270-F66A58A15CDA}"/>
               </a:ext>
               <a:ext uri="{C183D7F6-B498-43B3-948B-1728B52AA6E4}">
-                <adec:decorative xmlns="" xmlns:adec="http://schemas.microsoft.com/office/drawing/2017/decorative" val="1"/>
+                <adec:decorative xmlns:adec="http://schemas.microsoft.com/office/drawing/2017/decorative" val="1"/>
               </a:ext>
             </a:extLst>
           </p:cNvPr>
@@ -7179,7 +7231,7 @@
                 <a16:creationId xmlns:a16="http://schemas.microsoft.com/office/drawing/2014/main" id="{EA67B5B4-3A24-436E-B663-1B2EBFF8A0CD}"/>
               </a:ext>
               <a:ext uri="{C183D7F6-B498-43B3-948B-1728B52AA6E4}">
-                <adec:decorative xmlns="" xmlns:adec="http://schemas.microsoft.com/office/drawing/2017/decorative" val="1"/>
+                <adec:decorative xmlns:adec="http://schemas.microsoft.com/office/drawing/2017/decorative" val="1"/>
               </a:ext>
             </a:extLst>
           </p:cNvPr>
@@ -7242,7 +7294,7 @@
                 <a16:creationId xmlns:a16="http://schemas.microsoft.com/office/drawing/2014/main" id="{987FDF89-C993-41F4-A1B8-DBAFF16008A9}"/>
               </a:ext>
               <a:ext uri="{C183D7F6-B498-43B3-948B-1728B52AA6E4}">
-                <adec:decorative xmlns="" xmlns:adec="http://schemas.microsoft.com/office/drawing/2017/decorative" val="1"/>
+                <adec:decorative xmlns:adec="http://schemas.microsoft.com/office/drawing/2017/decorative" val="1"/>
               </a:ext>
             </a:extLst>
           </p:cNvPr>
@@ -7350,7 +7402,7 @@
                 <a16:creationId xmlns:a16="http://schemas.microsoft.com/office/drawing/2014/main" id="{64E585EA-75FD-4025-8270-F66A58A15CDA}"/>
               </a:ext>
               <a:ext uri="{C183D7F6-B498-43B3-948B-1728B52AA6E4}">
-                <adec:decorative xmlns="" xmlns:adec="http://schemas.microsoft.com/office/drawing/2017/decorative" val="1"/>
+                <adec:decorative xmlns:adec="http://schemas.microsoft.com/office/drawing/2017/decorative" val="1"/>
               </a:ext>
             </a:extLst>
           </p:cNvPr>
@@ -7578,7 +7630,7 @@
                 <a16:creationId xmlns:a16="http://schemas.microsoft.com/office/drawing/2014/main" id="{EA67B5B4-3A24-436E-B663-1B2EBFF8A0CD}"/>
               </a:ext>
               <a:ext uri="{C183D7F6-B498-43B3-948B-1728B52AA6E4}">
-                <adec:decorative xmlns="" xmlns:adec="http://schemas.microsoft.com/office/drawing/2017/decorative" val="1"/>
+                <adec:decorative xmlns:adec="http://schemas.microsoft.com/office/drawing/2017/decorative" val="1"/>
               </a:ext>
             </a:extLst>
           </p:cNvPr>
@@ -7641,7 +7693,7 @@
                 <a16:creationId xmlns:a16="http://schemas.microsoft.com/office/drawing/2014/main" id="{987FDF89-C993-41F4-A1B8-DBAFF16008A9}"/>
               </a:ext>
               <a:ext uri="{C183D7F6-B498-43B3-948B-1728B52AA6E4}">
-                <adec:decorative xmlns="" xmlns:adec="http://schemas.microsoft.com/office/drawing/2017/decorative" val="1"/>
+                <adec:decorative xmlns:adec="http://schemas.microsoft.com/office/drawing/2017/decorative" val="1"/>
               </a:ext>
             </a:extLst>
           </p:cNvPr>
@@ -7749,7 +7801,7 @@
                 <a16:creationId xmlns:a16="http://schemas.microsoft.com/office/drawing/2014/main" id="{64E585EA-75FD-4025-8270-F66A58A15CDA}"/>
               </a:ext>
               <a:ext uri="{C183D7F6-B498-43B3-948B-1728B52AA6E4}">
-                <adec:decorative xmlns="" xmlns:adec="http://schemas.microsoft.com/office/drawing/2017/decorative" val="1"/>
+                <adec:decorative xmlns:adec="http://schemas.microsoft.com/office/drawing/2017/decorative" val="1"/>
               </a:ext>
             </a:extLst>
           </p:cNvPr>
@@ -7977,7 +8029,7 @@
                 <a16:creationId xmlns:a16="http://schemas.microsoft.com/office/drawing/2014/main" id="{EA67B5B4-3A24-436E-B663-1B2EBFF8A0CD}"/>
               </a:ext>
               <a:ext uri="{C183D7F6-B498-43B3-948B-1728B52AA6E4}">
-                <adec:decorative xmlns="" xmlns:adec="http://schemas.microsoft.com/office/drawing/2017/decorative" val="1"/>
+                <adec:decorative xmlns:adec="http://schemas.microsoft.com/office/drawing/2017/decorative" val="1"/>
               </a:ext>
             </a:extLst>
           </p:cNvPr>
@@ -8040,7 +8092,7 @@
                 <a16:creationId xmlns:a16="http://schemas.microsoft.com/office/drawing/2014/main" id="{987FDF89-C993-41F4-A1B8-DBAFF16008A9}"/>
               </a:ext>
               <a:ext uri="{C183D7F6-B498-43B3-948B-1728B52AA6E4}">
-                <adec:decorative xmlns="" xmlns:adec="http://schemas.microsoft.com/office/drawing/2017/decorative" val="1"/>
+                <adec:decorative xmlns:adec="http://schemas.microsoft.com/office/drawing/2017/decorative" val="1"/>
               </a:ext>
             </a:extLst>
           </p:cNvPr>
@@ -8148,7 +8200,7 @@
                 <a16:creationId xmlns:a16="http://schemas.microsoft.com/office/drawing/2014/main" id="{64E585EA-75FD-4025-8270-F66A58A15CDA}"/>
               </a:ext>
               <a:ext uri="{C183D7F6-B498-43B3-948B-1728B52AA6E4}">
-                <adec:decorative xmlns="" xmlns:adec="http://schemas.microsoft.com/office/drawing/2017/decorative" val="1"/>
+                <adec:decorative xmlns:adec="http://schemas.microsoft.com/office/drawing/2017/decorative" val="1"/>
               </a:ext>
             </a:extLst>
           </p:cNvPr>
@@ -8328,16 +8380,67 @@
                   <a:srgbClr val="FFFFFF"/>
                 </a:solidFill>
               </a:rPr>
-              <a:t>H2</a:t>
-            </a:r>
-            <a:endParaRPr lang="de-DE" sz="2000" dirty="0">
-              <a:solidFill>
-                <a:srgbClr val="FFFFFF"/>
-              </a:solidFill>
-            </a:endParaRPr>
-          </a:p>
-        </p:txBody>
-      </p:sp>
+              <a:t>Database: H2</a:t>
+            </a:r>
+          </a:p>
+          <a:p>
+            <a:r>
+              <a:rPr lang="en-GB" sz="2000" dirty="0">
+                <a:solidFill>
+                  <a:srgbClr val="FFFFFF"/>
+                </a:solidFill>
+              </a:rPr>
+              <a:t>Test: write to the database 1000 times (game results) </a:t>
+            </a:r>
+          </a:p>
+          <a:p>
+            <a:r>
+              <a:rPr lang="de-DE" sz="2000" dirty="0">
+                <a:solidFill>
+                  <a:srgbClr val="FFFFFF"/>
+                </a:solidFill>
+              </a:rPr>
+              <a:t>Timing: </a:t>
+            </a:r>
+          </a:p>
+        </p:txBody>
+      </p:sp>
+      <p:pic>
+        <p:nvPicPr>
+          <p:cNvPr id="8" name="Content Placeholder 6">
+            <a:extLst>
+              <a:ext uri="{FF2B5EF4-FFF2-40B4-BE49-F238E27FC236}">
+                <a16:creationId xmlns:a16="http://schemas.microsoft.com/office/drawing/2014/main" id="{5036CE63-7B1F-884D-A49A-EB17B6B99349}"/>
+              </a:ext>
+            </a:extLst>
+          </p:cNvPr>
+          <p:cNvPicPr>
+            <a:picLocks noChangeAspect="1"/>
+          </p:cNvPicPr>
+          <p:nvPr/>
+        </p:nvPicPr>
+        <p:blipFill>
+          <a:blip r:embed="rId2">
+            <a:extLst>
+              <a:ext uri="{28A0092B-C50C-407E-A947-70E740481C1C}">
+                <a14:useLocalDpi xmlns:a14="http://schemas.microsoft.com/office/drawing/2010/main" val="0"/>
+              </a:ext>
+            </a:extLst>
+          </a:blip>
+          <a:stretch>
+            <a:fillRect/>
+          </a:stretch>
+        </p:blipFill>
+        <p:spPr>
+          <a:xfrm>
+            <a:off x="833004" y="3227408"/>
+            <a:ext cx="10515596" cy="2093872"/>
+          </a:xfrm>
+          <a:prstGeom prst="rect">
+            <a:avLst/>
+          </a:prstGeom>
+        </p:spPr>
+      </p:pic>
     </p:spTree>
     <p:extLst>
       <p:ext uri="{BB962C8B-B14F-4D97-AF65-F5344CB8AC3E}">

</xml_diff>